<commit_message>
Update Presentation with new Settings icon
</commit_message>
<xml_diff>
--- a/src/test/resources/DDT.pptx
+++ b/src/test/resources/DDT.pptx
@@ -1305,7 +1305,7 @@
       <dgm:spPr/>
     </dgm:pt>
     <dgm:pt modelId="{B3502AC9-BEDC-4470-9272-38C5CF71E02A}" type="pres">
-      <dgm:prSet presAssocID="{5C11B73B-DB00-4292-97C2-8F53E564FF2C}" presName="imagNode" presStyleLbl="fgImgPlace1" presStyleIdx="0" presStyleCnt="3" custScaleX="70691" custScaleY="104137"/>
+      <dgm:prSet presAssocID="{5C11B73B-DB00-4292-97C2-8F53E564FF2C}" presName="imagNode" presStyleLbl="fgImgPlace1" presStyleIdx="0" presStyleCnt="3" custScaleX="70691" custScaleY="104137" custLinFactNeighborY="-1683"/>
       <dgm:spPr>
         <a:blipFill rotWithShape="1">
           <a:blip xmlns:r="http://schemas.openxmlformats.org/officeDocument/2006/relationships" r:embed="rId1"/>
@@ -1495,7 +1495,7 @@
       </dsp:nvSpPr>
       <dsp:spPr>
         <a:xfrm>
-          <a:off x="634549" y="255266"/>
+          <a:off x="634549" y="228604"/>
           <a:ext cx="1803855" cy="1649736"/>
         </a:xfrm>
         <a:prstGeom prst="roundRect">
@@ -3235,7 +3235,7 @@
             <a:fld id="{11E7B261-CA80-4445-BF45-971B02F721E6}" type="datetimeFigureOut">
               <a:rPr lang="en-US" smtClean="0"/>
               <a:pPr/>
-              <a:t>10/27/2016</a:t>
+              <a:t>10/31/2016</a:t>
             </a:fld>
             <a:endParaRPr lang="en-US"/>
           </a:p>
@@ -3708,7 +3708,7 @@
             <a:fld id="{8ED77A7D-A649-4A8A-94FF-3B600ED29290}" type="datetimeFigureOut">
               <a:rPr lang="en-US" smtClean="0"/>
               <a:pPr/>
-              <a:t>10/27/2016</a:t>
+              <a:t>10/31/2016</a:t>
             </a:fld>
             <a:endParaRPr lang="en-US"/>
           </a:p>
@@ -8154,7 +8154,7 @@
             <a:fld id="{8ED77A7D-A649-4A8A-94FF-3B600ED29290}" type="datetimeFigureOut">
               <a:rPr lang="en-US" smtClean="0"/>
               <a:pPr/>
-              <a:t>10/27/2016</a:t>
+              <a:t>10/31/2016</a:t>
             </a:fld>
             <a:endParaRPr lang="en-US"/>
           </a:p>
@@ -10936,7 +10936,7 @@
             <p:ph idx="1"/>
             <p:extLst>
               <p:ext uri="{D42A27DB-BD31-4B8C-83A1-F6EECF244321}">
-                <p14:modId xmlns:p14="http://schemas.microsoft.com/office/powerpoint/2010/main" val="1975048735"/>
+                <p14:modId xmlns:p14="http://schemas.microsoft.com/office/powerpoint/2010/main" val="2241825771"/>
               </p:ext>
             </p:extLst>
           </p:nvPr>

</xml_diff>

<commit_message>
Bugs and a couple of new features
</commit_message>
<xml_diff>
--- a/src/test/resources/DDT.pptx
+++ b/src/test/resources/DDT.pptx
@@ -3235,7 +3235,7 @@
             <a:fld id="{11E7B261-CA80-4445-BF45-971B02F721E6}" type="datetimeFigureOut">
               <a:rPr lang="en-US" smtClean="0"/>
               <a:pPr/>
-              <a:t>10/31/2016</a:t>
+              <a:t>2/24/2017</a:t>
             </a:fld>
             <a:endParaRPr lang="en-US"/>
           </a:p>
@@ -3708,7 +3708,7 @@
             <a:fld id="{8ED77A7D-A649-4A8A-94FF-3B600ED29290}" type="datetimeFigureOut">
               <a:rPr lang="en-US" smtClean="0"/>
               <a:pPr/>
-              <a:t>10/31/2016</a:t>
+              <a:t>2/24/2017</a:t>
             </a:fld>
             <a:endParaRPr lang="en-US"/>
           </a:p>
@@ -8154,7 +8154,7 @@
             <a:fld id="{8ED77A7D-A649-4A8A-94FF-3B600ED29290}" type="datetimeFigureOut">
               <a:rPr lang="en-US" smtClean="0"/>
               <a:pPr/>
-              <a:t>10/31/2016</a:t>
+              <a:t>2/24/2017</a:t>
             </a:fld>
             <a:endParaRPr lang="en-US"/>
           </a:p>
@@ -9136,22 +9136,11 @@
               <a:rPr lang="en-US" dirty="0">
                 <a:latin typeface="AR ESSENCE" panose="02000000000000000000" pitchFamily="2" charset="0"/>
               </a:rPr>
-              <a:t>Implementation of “Application State” allows for re-use, increase stability, shorter scripting time and lower QA software maintenance.  Example:  </a:t>
-            </a:r>
-            <a:r>
-              <a:rPr lang="en-US" dirty="0" err="1">
-                <a:latin typeface="AR ESSENCE" panose="02000000000000000000" pitchFamily="2" charset="0"/>
-              </a:rPr>
-              <a:t>OrderFormEdit</a:t>
-            </a:r>
-            <a:r>
-              <a:rPr lang="en-US" dirty="0">
-                <a:latin typeface="AR ESSENCE" panose="02000000000000000000" pitchFamily="2" charset="0"/>
-              </a:rPr>
-              <a:t>.</a:t>
-            </a:r>
-          </a:p>
-          <a:p>
+              <a:t>Implementation of “Application State” allows for re-use, increase stability, shorter scripting time and lower QA software maintenance. </a:t>
+            </a:r>
+          </a:p>
+          <a:p>
+            <a:pPr lvl="0" algn="l" rtl="0"/>
             <a:r>
               <a:rPr lang="en-US" dirty="0">
                 <a:latin typeface="AR ESSENCE" panose="02000000000000000000" pitchFamily="2" charset="0"/>
@@ -9273,7 +9262,28 @@
               <a:rPr lang="en-US" dirty="0">
                 <a:latin typeface="AR ESSENCE" panose="02000000000000000000" pitchFamily="2" charset="0"/>
               </a:rPr>
-              <a:t>Supports scripting for scenarios that require it (OS operations, File operations.)</a:t>
+              <a:t>Supports user defined scripting for scenarios that require it.</a:t>
+            </a:r>
+          </a:p>
+          <a:p>
+            <a:pPr lvl="0" algn="l" rtl="0"/>
+            <a:r>
+              <a:rPr lang="en-US" dirty="0">
+                <a:latin typeface="AR ESSENCE" panose="02000000000000000000" pitchFamily="2" charset="0"/>
+              </a:rPr>
+              <a:t>Provides for defining and using variables </a:t>
+            </a:r>
+            <a:r>
+              <a:rPr lang="en-US">
+                <a:latin typeface="AR ESSENCE" panose="02000000000000000000" pitchFamily="2" charset="0"/>
+              </a:rPr>
+              <a:t>for greater </a:t>
+            </a:r>
+            <a:r>
+              <a:rPr lang="en-US" dirty="0">
+                <a:latin typeface="AR ESSENCE" panose="02000000000000000000" pitchFamily="2" charset="0"/>
+              </a:rPr>
+              <a:t>flexibility &amp; convenience.</a:t>
             </a:r>
           </a:p>
         </p:txBody>
@@ -11482,7 +11492,18 @@
               <a:rPr lang="en-US" sz="1800" dirty="0">
                 <a:latin typeface="AR ESSENCE" panose="02000000000000000000" pitchFamily="2" charset="0"/>
               </a:rPr>
-              <a:t>Recognition Engine.  The backbone of automation.  Should be able to recognize and activate UI Components.</a:t>
+              <a:t>Recognition Engine.  The backbone of automation.  </a:t>
+            </a:r>
+            <a:br>
+              <a:rPr lang="en-US" sz="1800" dirty="0">
+                <a:latin typeface="AR ESSENCE" panose="02000000000000000000" pitchFamily="2" charset="0"/>
+              </a:rPr>
+            </a:br>
+            <a:r>
+              <a:rPr lang="en-US" sz="1800" dirty="0">
+                <a:latin typeface="AR ESSENCE" panose="02000000000000000000" pitchFamily="2" charset="0"/>
+              </a:rPr>
+              <a:t>Should be able to recognize activate, interrogate and verify UI Components.</a:t>
             </a:r>
           </a:p>
           <a:p>
@@ -11790,6 +11811,15 @@
               <a:rPr lang="en-US" sz="2000" dirty="0">
                 <a:latin typeface="AR ESSENCE" panose="02000000000000000000" pitchFamily="2" charset="0"/>
               </a:rPr>
+              <a:t>DDT abstracts user’s interaction with the application (in contrast to page objects, etc.)</a:t>
+            </a:r>
+          </a:p>
+          <a:p>
+            <a:pPr lvl="0" algn="l" rtl="0"/>
+            <a:r>
+              <a:rPr lang="en-US" sz="2000" dirty="0">
+                <a:latin typeface="AR ESSENCE" panose="02000000000000000000" pitchFamily="2" charset="0"/>
+              </a:rPr>
               <a:t>Keyword (vocabulary) based on two levels.  </a:t>
             </a:r>
             <a:br>
@@ -11838,14 +11868,6 @@
               </a:rPr>
               <a:t>) created by QA Engineers by populating data source(s) such as Excel workbooks or xml files as collection of steps.</a:t>
             </a:r>
-            <a:br>
-              <a:rPr lang="en-US" sz="2000" dirty="0">
-                <a:latin typeface="AR ESSENCE" panose="02000000000000000000" pitchFamily="2" charset="0"/>
-              </a:rPr>
-            </a:br>
-            <a:endParaRPr lang="en-US" sz="2000" dirty="0">
-              <a:latin typeface="AR ESSENCE" panose="02000000000000000000" pitchFamily="2" charset="0"/>
-            </a:endParaRPr>
           </a:p>
           <a:p>
             <a:pPr lvl="0" algn="l" rtl="0"/>
@@ -11855,14 +11877,6 @@
               </a:rPr>
               <a:t>Both the data relevant to the application and application/test flow are stored externally separating the details of the testing (input source) from the implementation code.</a:t>
             </a:r>
-            <a:br>
-              <a:rPr lang="en-US" sz="2000" dirty="0">
-                <a:latin typeface="AR ESSENCE" panose="02000000000000000000" pitchFamily="2" charset="0"/>
-              </a:rPr>
-            </a:br>
-            <a:endParaRPr lang="en-US" sz="2000" dirty="0">
-              <a:latin typeface="AR ESSENCE" panose="02000000000000000000" pitchFamily="2" charset="0"/>
-            </a:endParaRPr>
           </a:p>
           <a:p>
             <a:pPr lvl="0" algn="l" rtl="0"/>
@@ -12142,7 +12156,7 @@
               <a:rPr lang="en-US" dirty="0">
                 <a:latin typeface="AR ESSENCE" panose="02000000000000000000" pitchFamily="2" charset="0"/>
               </a:rPr>
-              <a:t>Two types of steps, Activation and Verification.</a:t>
+              <a:t>Mostly, two main types of steps, Activation and Verification.</a:t>
             </a:r>
           </a:p>
           <a:p>
@@ -12163,7 +12177,7 @@
               <a:rPr lang="en-US" dirty="0">
                 <a:latin typeface="AR ESSENCE" panose="02000000000000000000" pitchFamily="2" charset="0"/>
               </a:rPr>
-              <a:t>, Select… - defined by Developer)</a:t>
+              <a:t>, Select… - defined by Developer – cannot be modified by analyst / QA staff)</a:t>
             </a:r>
           </a:p>
           <a:p>

</xml_diff>